<commit_message>
working on Module 10
</commit_message>
<xml_diff>
--- a/Slides/Lesson 10.5 Generalizing this Design.pptx
+++ b/Slides/Lesson 10.5 Generalizing this Design.pptx
@@ -225,7 +225,7 @@
           <a:p>
             <a:fld id="{B7676462-FC52-45C7-85E1-16BDE2BE239E}" type="datetimeFigureOut">
               <a:rPr lang="en-US" smtClean="0"/>
-              <a:t>11/6/2016</a:t>
+              <a:t>11/7/2016</a:t>
             </a:fld>
             <a:endParaRPr lang="en-US"/>
           </a:p>
@@ -839,7 +839,7 @@
           <a:p>
             <a:fld id="{2F1F79F5-7BEC-496A-AFC7-876E38F64D71}" type="datetime1">
               <a:rPr lang="en-US" smtClean="0"/>
-              <a:t>11/6/2016</a:t>
+              <a:t>11/7/2016</a:t>
             </a:fld>
             <a:endParaRPr lang="en-US"/>
           </a:p>
@@ -956,7 +956,7 @@
           <a:p>
             <a:fld id="{2F7B77F5-1464-4F6B-92A8-64FC8A508293}" type="datetime1">
               <a:rPr lang="en-US" smtClean="0"/>
-              <a:t>11/6/2016</a:t>
+              <a:t>11/7/2016</a:t>
             </a:fld>
             <a:endParaRPr lang="en-US"/>
           </a:p>
@@ -1051,7 +1051,7 @@
           <a:p>
             <a:fld id="{0A05703A-7669-4FEA-9056-25299B4D29D4}" type="datetime1">
               <a:rPr lang="en-US" smtClean="0"/>
-              <a:t>11/6/2016</a:t>
+              <a:t>11/7/2016</a:t>
             </a:fld>
             <a:endParaRPr lang="en-US"/>
           </a:p>
@@ -1326,7 +1326,7 @@
           <a:p>
             <a:fld id="{6E5077B5-BB57-49DB-88CA-226A139E5C01}" type="datetime1">
               <a:rPr lang="en-US" smtClean="0"/>
-              <a:t>11/6/2016</a:t>
+              <a:t>11/7/2016</a:t>
             </a:fld>
             <a:endParaRPr lang="en-US"/>
           </a:p>
@@ -1578,7 +1578,7 @@
           <a:p>
             <a:fld id="{C48D9447-CBD6-49A1-89FD-8512A8CF8999}" type="datetime1">
               <a:rPr lang="en-US" smtClean="0"/>
-              <a:t>11/6/2016</a:t>
+              <a:t>11/7/2016</a:t>
             </a:fld>
             <a:endParaRPr lang="en-US"/>
           </a:p>
@@ -1746,7 +1746,7 @@
           <a:p>
             <a:fld id="{A3639A2A-823D-48B7-9ACE-7FAF42870BA9}" type="datetime1">
               <a:rPr lang="en-US" smtClean="0"/>
-              <a:t>11/6/2016</a:t>
+              <a:t>11/7/2016</a:t>
             </a:fld>
             <a:endParaRPr lang="en-US"/>
           </a:p>
@@ -1924,7 +1924,7 @@
           <a:p>
             <a:fld id="{ED1B6996-82E9-463C-972C-7B56056E426C}" type="datetime1">
               <a:rPr lang="en-US" smtClean="0"/>
-              <a:t>11/6/2016</a:t>
+              <a:t>11/7/2016</a:t>
             </a:fld>
             <a:endParaRPr lang="en-US"/>
           </a:p>
@@ -2098,7 +2098,7 @@
           <a:p>
             <a:fld id="{E22ED4DA-448D-4BB1-B935-CC112220207B}" type="datetime1">
               <a:rPr lang="en-US" smtClean="0"/>
-              <a:t>11/6/2016</a:t>
+              <a:t>11/7/2016</a:t>
             </a:fld>
             <a:endParaRPr lang="en-US"/>
           </a:p>
@@ -2271,7 +2271,7 @@
           <a:p>
             <a:fld id="{E22ED4DA-448D-4BB1-B935-CC112220207B}" type="datetime1">
               <a:rPr lang="en-US" smtClean="0"/>
-              <a:t>11/6/2016</a:t>
+              <a:t>11/7/2016</a:t>
             </a:fld>
             <a:endParaRPr lang="en-US"/>
           </a:p>
@@ -2531,7 +2531,7 @@
           <a:p>
             <a:fld id="{FF5D65A6-AB94-4435-B0B7-3743215FA46C}" type="datetime1">
               <a:rPr lang="en-US" smtClean="0"/>
-              <a:t>11/6/2016</a:t>
+              <a:t>11/7/2016</a:t>
             </a:fld>
             <a:endParaRPr lang="en-US"/>
           </a:p>
@@ -2824,7 +2824,7 @@
           <a:p>
             <a:fld id="{5D1846AD-9252-4647-9435-4C2AC365653A}" type="datetime1">
               <a:rPr lang="en-US" smtClean="0"/>
-              <a:t>11/6/2016</a:t>
+              <a:t>11/7/2016</a:t>
             </a:fld>
             <a:endParaRPr lang="en-US"/>
           </a:p>
@@ -3000,7 +3000,7 @@
           <a:p>
             <a:fld id="{FF5D65A6-AB94-4435-B0B7-3743215FA46C}" type="datetime1">
               <a:rPr lang="en-US" smtClean="0"/>
-              <a:t>11/6/2016</a:t>
+              <a:t>11/7/2016</a:t>
             </a:fld>
             <a:endParaRPr lang="en-US"/>
           </a:p>
@@ -3294,7 +3294,7 @@
           <a:p>
             <a:fld id="{7C193DC4-6EF0-48C9-B29C-616106A645E1}" type="datetime1">
               <a:rPr lang="en-US" smtClean="0"/>
-              <a:t>11/6/2016</a:t>
+              <a:t>11/7/2016</a:t>
             </a:fld>
             <a:endParaRPr lang="en-US"/>
           </a:p>
@@ -3579,7 +3579,7 @@
           <a:p>
             <a:fld id="{5D1846AD-9252-4647-9435-4C2AC365653A}" type="datetime1">
               <a:rPr lang="en-US" smtClean="0"/>
-              <a:t>11/6/2016</a:t>
+              <a:t>11/7/2016</a:t>
             </a:fld>
             <a:endParaRPr lang="en-US"/>
           </a:p>
@@ -3998,7 +3998,7 @@
           <a:p>
             <a:fld id="{CE56DC10-3561-4063-A6AF-C1CC7A41040A}" type="datetime1">
               <a:rPr lang="en-US" smtClean="0"/>
-              <a:t>11/6/2016</a:t>
+              <a:t>11/7/2016</a:t>
             </a:fld>
             <a:endParaRPr lang="en-US"/>
           </a:p>
@@ -4221,7 +4221,7 @@
           <a:p>
             <a:fld id="{02B3F677-983B-48DB-ADFD-63FE6CBC7FB2}" type="datetime1">
               <a:rPr lang="en-US" smtClean="0"/>
-              <a:t>11/6/2016</a:t>
+              <a:t>11/7/2016</a:t>
             </a:fld>
             <a:endParaRPr lang="en-US"/>
           </a:p>
@@ -4864,233 +4864,184 @@
             <p:ph idx="1"/>
           </p:nvPr>
         </p:nvSpPr>
-        <p:spPr/>
+        <p:spPr>
+          <a:xfrm>
+            <a:off x="457200" y="1600200"/>
+            <a:ext cx="8229600" cy="4756150"/>
+          </a:xfrm>
+        </p:spPr>
         <p:txBody>
           <a:bodyPr>
-            <a:normAutofit fontScale="32500" lnSpcReduction="20000"/>
+            <a:noAutofit/>
           </a:bodyPr>
           <a:lstStyle/>
           <a:p>
             <a:r>
-              <a:rPr lang="en-US" dirty="0"/>
-              <a:t>;; The </a:t>
-            </a:r>
-            <a:r>
-              <a:rPr lang="en-US" dirty="0" err="1"/>
+              <a:rPr lang="en-US" sz="1100" dirty="0"/>
+              <a:t>(define </a:t>
+            </a:r>
+            <a:r>
+              <a:rPr lang="en-US" sz="1100" dirty="0" err="1"/>
               <a:t>BallFactory</a:t>
             </a:r>
             <a:r>
-              <a:rPr lang="en-US" dirty="0"/>
-              <a:t>% class</a:t>
-            </a:r>
-          </a:p>
-          <a:p>
-            <a:endParaRPr lang="en-US" dirty="0"/>
-          </a:p>
-          <a:p>
-            <a:r>
-              <a:rPr lang="en-US" dirty="0"/>
-              <a:t>;; accepts "b" key events and adds them to the world.</a:t>
-            </a:r>
-          </a:p>
-          <a:p>
-            <a:r>
-              <a:rPr lang="en-US" dirty="0"/>
-              <a:t>;; gets the world as an </a:t>
-            </a:r>
-            <a:r>
-              <a:rPr lang="en-US" dirty="0" err="1"/>
+              <a:rPr lang="en-US" sz="1100" dirty="0"/>
+              <a:t>%</a:t>
+            </a:r>
+          </a:p>
+          <a:p>
+            <a:r>
+              <a:rPr lang="en-US" sz="1100" dirty="0"/>
+              <a:t>  (class* object% (</a:t>
+            </a:r>
+            <a:r>
+              <a:rPr lang="en-US" sz="1100" dirty="0" err="1"/>
+              <a:t>SWidget</a:t>
+            </a:r>
+            <a:r>
+              <a:rPr lang="en-US" sz="1100" dirty="0"/>
+              <a:t>&lt;%&gt;)</a:t>
+            </a:r>
+          </a:p>
+          <a:p>
+            <a:endParaRPr lang="en-US" sz="1100" dirty="0"/>
+          </a:p>
+          <a:p>
+            <a:r>
+              <a:rPr lang="en-US" sz="1100" dirty="0"/>
+              <a:t>    (</a:t>
+            </a:r>
+            <a:r>
+              <a:rPr lang="en-US" sz="1100" dirty="0" err="1"/>
               <a:t>init</a:t>
             </a:r>
             <a:r>
-              <a:rPr lang="en-US" dirty="0"/>
-              <a:t>-field</a:t>
-            </a:r>
-          </a:p>
-          <a:p>
-            <a:endParaRPr lang="en-US" dirty="0"/>
-          </a:p>
-          <a:p>
-            <a:r>
-              <a:rPr lang="en-US" dirty="0"/>
-              <a:t>(define </a:t>
-            </a:r>
-            <a:r>
-              <a:rPr lang="en-US" dirty="0" err="1"/>
-              <a:t>BallFactory</a:t>
-            </a:r>
-            <a:r>
-              <a:rPr lang="en-US" dirty="0"/>
-              <a:t>%</a:t>
-            </a:r>
-          </a:p>
-          <a:p>
-            <a:r>
-              <a:rPr lang="en-US" dirty="0"/>
-              <a:t>  (class* object% (</a:t>
-            </a:r>
-            <a:r>
-              <a:rPr lang="en-US" dirty="0" err="1"/>
-              <a:t>SWidget</a:t>
-            </a:r>
-            <a:r>
-              <a:rPr lang="en-US" dirty="0"/>
-              <a:t>&lt;%&gt;)</a:t>
-            </a:r>
-          </a:p>
-          <a:p>
-            <a:endParaRPr lang="en-US" dirty="0"/>
-          </a:p>
-          <a:p>
-            <a:r>
-              <a:rPr lang="en-US" dirty="0"/>
+              <a:rPr lang="en-US" sz="1100" dirty="0"/>
+              <a:t>-field world)  ; the world to which the factory adds balls</a:t>
+            </a:r>
+          </a:p>
+          <a:p>
+            <a:r>
+              <a:rPr lang="en-US" sz="1100" dirty="0"/>
               <a:t>    (</a:t>
             </a:r>
             <a:r>
-              <a:rPr lang="en-US" dirty="0" err="1"/>
+              <a:rPr lang="en-US" sz="1100" dirty="0" err="1"/>
               <a:t>init</a:t>
             </a:r>
             <a:r>
-              <a:rPr lang="en-US" dirty="0"/>
-              <a:t>-field world)  ; the world to which the factory adds balls</a:t>
-            </a:r>
-          </a:p>
-          <a:p>
-            <a:r>
-              <a:rPr lang="en-US" dirty="0"/>
-              <a:t>    (</a:t>
-            </a:r>
-            <a:r>
-              <a:rPr lang="en-US" dirty="0" err="1"/>
-              <a:t>init</a:t>
-            </a:r>
-            <a:r>
-              <a:rPr lang="en-US" dirty="0"/>
+              <a:rPr lang="en-US" sz="1100" dirty="0"/>
               <a:t>-field wall)   ; the wall that the new balls should bounce</a:t>
             </a:r>
           </a:p>
           <a:p>
             <a:r>
-              <a:rPr lang="en-US" dirty="0"/>
+              <a:rPr lang="en-US" sz="1100" dirty="0"/>
               <a:t>                        ; off of.</a:t>
             </a:r>
           </a:p>
           <a:p>
-            <a:endParaRPr lang="en-US" dirty="0"/>
-          </a:p>
-          <a:p>
-            <a:r>
-              <a:rPr lang="en-US" dirty="0"/>
+            <a:endParaRPr lang="en-US" sz="1100" dirty="0"/>
+          </a:p>
+          <a:p>
+            <a:r>
+              <a:rPr lang="en-US" sz="1100" dirty="0"/>
               <a:t>    (super-new)</a:t>
             </a:r>
           </a:p>
           <a:p>
-            <a:endParaRPr lang="en-US" dirty="0"/>
-          </a:p>
-          <a:p>
-            <a:r>
-              <a:rPr lang="en-US" dirty="0"/>
+            <a:endParaRPr lang="en-US" sz="1100" dirty="0"/>
+          </a:p>
+          <a:p>
+            <a:r>
+              <a:rPr lang="en-US" sz="1100" dirty="0"/>
               <a:t>    (define/public (after-key-event </a:t>
             </a:r>
             <a:r>
-              <a:rPr lang="en-US" dirty="0" err="1"/>
+              <a:rPr lang="en-US" sz="1100" dirty="0" err="1"/>
               <a:t>kev</a:t>
             </a:r>
             <a:r>
-              <a:rPr lang="en-US" dirty="0"/>
+              <a:rPr lang="en-US" sz="1100" dirty="0"/>
               <a:t>)</a:t>
             </a:r>
           </a:p>
           <a:p>
             <a:r>
-              <a:rPr lang="en-US" dirty="0"/>
+              <a:rPr lang="en-US" sz="1100" dirty="0"/>
               <a:t>      (cond</a:t>
             </a:r>
           </a:p>
           <a:p>
             <a:r>
-              <a:rPr lang="en-US" dirty="0"/>
+              <a:rPr lang="en-US" sz="1100" dirty="0"/>
               <a:t>        [(key=? </a:t>
             </a:r>
             <a:r>
-              <a:rPr lang="en-US" dirty="0" err="1"/>
+              <a:rPr lang="en-US" sz="1100" dirty="0" err="1"/>
               <a:t>kev</a:t>
             </a:r>
             <a:r>
-              <a:rPr lang="en-US" dirty="0"/>
+              <a:rPr lang="en-US" sz="1100" dirty="0"/>
               <a:t> "b")</a:t>
             </a:r>
           </a:p>
           <a:p>
             <a:r>
-              <a:rPr lang="en-US" dirty="0"/>
+              <a:rPr lang="en-US" sz="1100" dirty="0"/>
               <a:t>         (send world add-widget (new Ball% [w wall]))]))</a:t>
             </a:r>
           </a:p>
           <a:p>
-            <a:endParaRPr lang="en-US" dirty="0"/>
-          </a:p>
-          <a:p>
-            <a:r>
-              <a:rPr lang="en-US" dirty="0"/>
-              <a:t>    ;; the Ball Factory has no other behavior. Return nonsense values for Void,</a:t>
-            </a:r>
-          </a:p>
-          <a:p>
-            <a:r>
-              <a:rPr lang="en-US" dirty="0"/>
-              <a:t>    ;; to aid </a:t>
-            </a:r>
-            <a:r>
-              <a:rPr lang="en-US"/>
-              <a:t>in debugging.</a:t>
-            </a:r>
-            <a:endParaRPr lang="en-US" dirty="0"/>
-          </a:p>
-          <a:p>
-            <a:endParaRPr lang="en-US" dirty="0"/>
-          </a:p>
-          <a:p>
-            <a:r>
-              <a:rPr lang="en-US" dirty="0"/>
+            <a:endParaRPr lang="en-US" sz="1100" dirty="0"/>
+          </a:p>
+          <a:p>
+            <a:r>
+              <a:rPr lang="en-US" sz="1100" dirty="0"/>
+              <a:t>    ;; the Ball Factory has no other behavior. Return nonsense values for Void, to aid in debugging.</a:t>
+            </a:r>
+          </a:p>
+          <a:p>
+            <a:endParaRPr lang="en-US" sz="1100" dirty="0"/>
+          </a:p>
+          <a:p>
+            <a:r>
+              <a:rPr lang="en-US" sz="1100" dirty="0"/>
               <a:t>    (define/public (after-tick) 15)</a:t>
             </a:r>
           </a:p>
           <a:p>
             <a:r>
-              <a:rPr lang="en-US" dirty="0"/>
+              <a:rPr lang="en-US" sz="1100" dirty="0"/>
               <a:t>    (define/public (after-button-down mx my) 16)</a:t>
             </a:r>
           </a:p>
           <a:p>
             <a:r>
-              <a:rPr lang="en-US" dirty="0"/>
+              <a:rPr lang="en-US" sz="1100" dirty="0"/>
               <a:t>    (define/public (after-button-up mx my) 17)</a:t>
             </a:r>
           </a:p>
           <a:p>
             <a:r>
-              <a:rPr lang="en-US" dirty="0"/>
+              <a:rPr lang="en-US" sz="1100" dirty="0"/>
               <a:t>    (define/public (after-drag mx my) 18)</a:t>
             </a:r>
           </a:p>
           <a:p>
             <a:r>
-              <a:rPr lang="en-US" dirty="0"/>
+              <a:rPr lang="en-US" sz="1100" dirty="0"/>
               <a:t>    (define/public (add-to-scene s) s)</a:t>
             </a:r>
           </a:p>
           <a:p>
-            <a:endParaRPr lang="en-US" dirty="0"/>
-          </a:p>
-          <a:p>
-            <a:r>
-              <a:rPr lang="en-US" dirty="0"/>
+            <a:endParaRPr lang="en-US" sz="1100" dirty="0"/>
+          </a:p>
+          <a:p>
+            <a:r>
+              <a:rPr lang="en-US" sz="1100" dirty="0"/>
               <a:t>    ))</a:t>
             </a:r>
-          </a:p>
-          <a:p>
-            <a:endParaRPr lang="en-US" dirty="0"/>
           </a:p>
         </p:txBody>
       </p:sp>
@@ -5125,19 +5076,21 @@
         </p:nvSpPr>
         <p:spPr>
           <a:xfrm>
-            <a:off x="5638800" y="2286000"/>
-            <a:ext cx="3048000" cy="1676400"/>
+            <a:off x="5867400" y="1920875"/>
+            <a:ext cx="3048000" cy="2057400"/>
           </a:xfrm>
           <a:prstGeom prst="rect">
             <a:avLst/>
           </a:prstGeom>
           <a:solidFill>
-            <a:schemeClr val="accent3">
-              <a:lumMod val="40000"/>
-              <a:lumOff val="60000"/>
+            <a:schemeClr val="accent1">
+              <a:lumMod val="20000"/>
+              <a:lumOff val="80000"/>
             </a:schemeClr>
           </a:solidFill>
-          <a:ln/>
+          <a:ln>
+            <a:noFill/>
+          </a:ln>
         </p:spPr>
         <p:style>
           <a:lnRef idx="2">
@@ -5169,7 +5122,7 @@
                   <a:schemeClr val="tx1"/>
                 </a:solidFill>
               </a:rPr>
-              <a:t>The factory receives key events from the world.  On each "b", it creates a new ball, and then passes it to the world as an argument to </a:t>
+              <a:t>The factory receives key events from the world.  On each "b", it creates a new ball, and then passes the new ball to the world as an argument to </a:t>
             </a:r>
             <a:r>
               <a:rPr lang="en-US" b="1" dirty="0">
@@ -5343,7 +5296,7 @@
             </a:pPr>
             <a:r>
               <a:rPr lang="en-US" sz="1600" dirty="0"/>
-              <a:t>       (make-world-state (list the-ball) (list the-wall)))</a:t>
+              <a:t>       (make-world (list the-ball) (list the-wall)))</a:t>
             </a:r>
           </a:p>
           <a:p>
@@ -5457,12 +5410,14 @@
             <a:avLst/>
           </a:prstGeom>
           <a:solidFill>
-            <a:schemeClr val="accent3">
-              <a:lumMod val="40000"/>
-              <a:lumOff val="60000"/>
+            <a:schemeClr val="accent1">
+              <a:lumMod val="20000"/>
+              <a:lumOff val="80000"/>
             </a:schemeClr>
           </a:solidFill>
-          <a:ln/>
+          <a:ln>
+            <a:noFill/>
+          </a:ln>
         </p:spPr>
         <p:style>
           <a:lnRef idx="2">
@@ -5754,7 +5709,19 @@
           <a:p>
             <a:r>
               <a:rPr lang="en-US" dirty="0"/>
-              <a:t>Go play with 10-4-ball-factory.rkt</a:t>
+              <a:t>Go play with 10-5-ball-factory.rkt</a:t>
+            </a:r>
+          </a:p>
+          <a:p>
+            <a:r>
+              <a:rPr lang="en-US" dirty="0"/>
+              <a:t>Draw a diagram of the various classes in this system.</a:t>
+            </a:r>
+          </a:p>
+          <a:p>
+            <a:r>
+              <a:rPr lang="en-US" dirty="0"/>
+              <a:t>Draw a diagram of the different objects in this system.</a:t>
             </a:r>
           </a:p>
         </p:txBody>
@@ -5974,7 +5941,7 @@
           <a:p>
             <a:r>
               <a:rPr lang="en-US" dirty="0"/>
-              <a:t>Study 10-4-ball-factory.rkt in the Examples folder.</a:t>
+              <a:t>Study 10-5-ball-factory.rkt in the Examples folder.</a:t>
             </a:r>
           </a:p>
           <a:p>
@@ -5985,12 +5952,8 @@
           </a:p>
           <a:p>
             <a:r>
-              <a:rPr lang="en-US"/>
-              <a:t>Go </a:t>
-            </a:r>
-            <a:r>
-              <a:rPr lang="en-US" dirty="0"/>
-              <a:t>on to the next lesson.</a:t>
+              <a:rPr lang="en-US" dirty="0"/>
+              <a:t>Go on to the next lesson.</a:t>
             </a:r>
           </a:p>
         </p:txBody>
@@ -6733,12 +6696,14 @@
             <a:avLst/>
           </a:prstGeom>
           <a:solidFill>
-            <a:schemeClr val="accent3">
-              <a:lumMod val="40000"/>
-              <a:lumOff val="60000"/>
+            <a:schemeClr val="accent1">
+              <a:lumMod val="20000"/>
+              <a:lumOff val="80000"/>
             </a:schemeClr>
           </a:solidFill>
-          <a:ln/>
+          <a:ln>
+            <a:noFill/>
+          </a:ln>
         </p:spPr>
         <p:style>
           <a:lnRef idx="2">
@@ -6868,7 +6833,7 @@
           <a:p>
             <a:r>
               <a:rPr lang="en-US" dirty="0"/>
-              <a:t>(define (make-world-state </a:t>
+              <a:t>(define (make-world </a:t>
             </a:r>
             <a:r>
               <a:rPr lang="en-US" dirty="0" err="1"/>
@@ -6973,7 +6938,7 @@
             </a:r>
             <a:r>
               <a:rPr lang="en-US" dirty="0"/>
-              <a:t>)  ; </a:t>
+              <a:t>)   ; </a:t>
             </a:r>
             <a:r>
               <a:rPr lang="en-US" dirty="0" err="1"/>
@@ -7197,25 +7162,27 @@
       </p:sp>
       <p:sp>
         <p:nvSpPr>
-          <p:cNvPr id="5" name="Rectangle 4"/>
+          <p:cNvPr id="6" name="Rectangle 5"/>
           <p:cNvSpPr/>
           <p:nvPr/>
         </p:nvSpPr>
         <p:spPr>
           <a:xfrm>
-            <a:off x="5715000" y="1752600"/>
-            <a:ext cx="2362200" cy="1676400"/>
+            <a:off x="5029200" y="4256538"/>
+            <a:ext cx="2850292" cy="1066800"/>
           </a:xfrm>
           <a:prstGeom prst="rect">
             <a:avLst/>
           </a:prstGeom>
           <a:solidFill>
-            <a:schemeClr val="accent3">
-              <a:lumMod val="40000"/>
-              <a:lumOff val="60000"/>
+            <a:schemeClr val="accent1">
+              <a:lumMod val="20000"/>
+              <a:lumOff val="80000"/>
             </a:schemeClr>
           </a:solidFill>
-          <a:ln/>
+          <a:ln>
+            <a:noFill/>
+          </a:ln>
         </p:spPr>
         <p:style>
           <a:lnRef idx="2">
@@ -7232,62 +7199,6 @@
           </a:fontRef>
         </p:style>
         <p:txBody>
-          <a:bodyPr rot="0" spcFirstLastPara="0" vertOverflow="overflow" horzOverflow="overflow" vert="horz" wrap="square" lIns="91440" tIns="45720" rIns="91440" bIns="45720" numCol="1" spcCol="0" rtlCol="0" fromWordArt="0" anchor="t" anchorCtr="0" forceAA="0" compatLnSpc="1">
-            <a:prstTxWarp prst="textNoShape">
-              <a:avLst/>
-            </a:prstTxWarp>
-            <a:noAutofit/>
-          </a:bodyPr>
-          <a:lstStyle/>
-          <a:p>
-            <a:r>
-              <a:rPr lang="en-US" sz="1400" dirty="0">
-                <a:solidFill>
-                  <a:schemeClr val="tx1"/>
-                </a:solidFill>
-              </a:rPr>
-              <a:t>In keeping with Lesson 10.3, I've changed the name of this class of World% to World%, since it models an actual world, not merely the mathematical value that is its state.</a:t>
-            </a:r>
-          </a:p>
-        </p:txBody>
-      </p:sp>
-      <p:sp>
-        <p:nvSpPr>
-          <p:cNvPr id="6" name="Rectangle 5"/>
-          <p:cNvSpPr/>
-          <p:nvPr/>
-        </p:nvSpPr>
-        <p:spPr>
-          <a:xfrm>
-            <a:off x="5029200" y="4256538"/>
-            <a:ext cx="2850292" cy="1066800"/>
-          </a:xfrm>
-          <a:prstGeom prst="rect">
-            <a:avLst/>
-          </a:prstGeom>
-          <a:solidFill>
-            <a:schemeClr val="accent3">
-              <a:lumMod val="40000"/>
-              <a:lumOff val="60000"/>
-            </a:schemeClr>
-          </a:solidFill>
-          <a:ln/>
-        </p:spPr>
-        <p:style>
-          <a:lnRef idx="2">
-            <a:schemeClr val="accent1"/>
-          </a:lnRef>
-          <a:fillRef idx="1">
-            <a:schemeClr val="lt1"/>
-          </a:fillRef>
-          <a:effectRef idx="0">
-            <a:schemeClr val="accent1"/>
-          </a:effectRef>
-          <a:fontRef idx="minor">
-            <a:schemeClr val="dk1"/>
-          </a:fontRef>
-        </p:style>
-        <p:txBody>
           <a:bodyPr rot="0" spcFirstLastPara="0" vertOverflow="overflow" horzOverflow="overflow" vert="horz" wrap="square" lIns="91440" tIns="45720" rIns="91440" bIns="45720" numCol="1" spcCol="0" rtlCol="0" fromWordArt="0" anchor="ctr" anchorCtr="0" forceAA="0" compatLnSpc="1">
             <a:prstTxWarp prst="textNoShape">
               <a:avLst/>
@@ -7303,46 +7214,11 @@
                   <a:schemeClr val="tx1"/>
                 </a:solidFill>
               </a:rPr>
-              <a:t>We replace each call to make-world-state or new with a suitable set!, just as in the preceding lesson.</a:t>
-            </a:r>
-          </a:p>
-        </p:txBody>
-      </p:sp>
-      <p:cxnSp>
-        <p:nvCxnSpPr>
-          <p:cNvPr id="8" name="Straight Arrow Connector 7"/>
-          <p:cNvCxnSpPr>
-            <a:stCxn id="5" idx="1"/>
-          </p:cNvCxnSpPr>
-          <p:nvPr/>
-        </p:nvCxnSpPr>
-        <p:spPr>
-          <a:xfrm flipH="1" flipV="1">
-            <a:off x="1676400" y="2362200"/>
-            <a:ext cx="4038600" cy="228600"/>
-          </a:xfrm>
-          <a:prstGeom prst="straightConnector1">
-            <a:avLst/>
-          </a:prstGeom>
-          <a:ln>
-            <a:tailEnd type="triangle"/>
-          </a:ln>
-        </p:spPr>
-        <p:style>
-          <a:lnRef idx="1">
-            <a:schemeClr val="accent1"/>
-          </a:lnRef>
-          <a:fillRef idx="0">
-            <a:schemeClr val="accent1"/>
-          </a:fillRef>
-          <a:effectRef idx="0">
-            <a:schemeClr val="accent1"/>
-          </a:effectRef>
-          <a:fontRef idx="minor">
-            <a:schemeClr val="tx1"/>
-          </a:fontRef>
-        </p:style>
-      </p:cxnSp>
+              <a:t>We replace each call to make-world or new with a suitable set!, just as in the preceding lesson.</a:t>
+            </a:r>
+          </a:p>
+        </p:txBody>
+      </p:sp>
       <p:cxnSp>
         <p:nvCxnSpPr>
           <p:cNvPr id="10" name="Straight Arrow Connector 9"/>
@@ -7359,7 +7235,7 @@
           <a:prstGeom prst="straightConnector1">
             <a:avLst/>
           </a:prstGeom>
-          <a:ln>
+          <a:ln w="12700">
             <a:tailEnd type="triangle"/>
           </a:ln>
         </p:spPr>
@@ -7647,19 +7523,21 @@
         </p:nvSpPr>
         <p:spPr>
           <a:xfrm>
-            <a:off x="5562600" y="2743200"/>
-            <a:ext cx="2667000" cy="2590800"/>
+            <a:off x="5791200" y="2034381"/>
+            <a:ext cx="2667000" cy="3657600"/>
           </a:xfrm>
           <a:prstGeom prst="rect">
             <a:avLst/>
           </a:prstGeom>
           <a:solidFill>
-            <a:schemeClr val="accent3">
-              <a:lumMod val="40000"/>
-              <a:lumOff val="60000"/>
+            <a:schemeClr val="accent1">
+              <a:lumMod val="20000"/>
+              <a:lumOff val="80000"/>
             </a:schemeClr>
           </a:solidFill>
-          <a:ln/>
+          <a:ln>
+            <a:noFill/>
+          </a:ln>
         </p:spPr>
         <p:style>
           <a:lnRef idx="2">
@@ -7690,7 +7568,7 @@
             </a:r>
             <a:r>
               <a:rPr lang="en-US" b="1" dirty="0"/>
-              <a:t>Big-bang</a:t>
+              <a:t>big-bang</a:t>
             </a:r>
             <a:r>
               <a:rPr lang="en-US" dirty="0"/>
@@ -7700,7 +7578,27 @@
           <a:p>
             <a:r>
               <a:rPr lang="en-US" b="1" dirty="0"/>
-              <a:t>(begin (send w ...) w)</a:t>
+              <a:t>(begin (send w ...) w) </a:t>
+            </a:r>
+            <a:r>
+              <a:rPr lang="en-US" dirty="0"/>
+              <a:t>. The world is stable; it just changes its internal state. So </a:t>
+            </a:r>
+            <a:r>
+              <a:rPr lang="en-US" b="1" dirty="0"/>
+              <a:t>w</a:t>
+            </a:r>
+            <a:r>
+              <a:rPr lang="en-US" dirty="0"/>
+              <a:t> is the right world to return to </a:t>
+            </a:r>
+            <a:r>
+              <a:rPr lang="en-US" b="1" dirty="0"/>
+              <a:t>big-bang</a:t>
+            </a:r>
+            <a:r>
+              <a:rPr lang="en-US" dirty="0"/>
+              <a:t>.</a:t>
             </a:r>
             <a:endParaRPr lang="en-US" b="1" dirty="0">
               <a:solidFill>
@@ -7825,7 +7723,7 @@
           <a:p>
             <a:r>
               <a:rPr lang="en-US" sz="1800" dirty="0"/>
-              <a:t>    (make-world-state</a:t>
+              <a:t>    (make-world</a:t>
             </a:r>
           </a:p>
           <a:p>
@@ -7943,10 +7841,16 @@
               <a:t>First we add it to the interface </a:t>
             </a:r>
             <a:r>
+              <a:rPr lang="en-US" dirty="0" err="1">
+                <a:latin typeface="+mn-lt"/>
+              </a:rPr>
+              <a:t>SWorld</a:t>
+            </a:r>
+            <a:r>
               <a:rPr lang="en-US" dirty="0">
                 <a:latin typeface="+mn-lt"/>
               </a:rPr>
-              <a:t>World&lt;%&gt; </a:t>
+              <a:t>&lt;%&gt; </a:t>
             </a:r>
             <a:r>
               <a:rPr lang="en-US" b="0" dirty="0">

</xml_diff>

<commit_message>
Module 10 RC 1
</commit_message>
<xml_diff>
--- a/Slides/Lesson 10.5 Generalizing this Design.pptx
+++ b/Slides/Lesson 10.5 Generalizing this Design.pptx
@@ -225,7 +225,7 @@
           <a:p>
             <a:fld id="{B7676462-FC52-45C7-85E1-16BDE2BE239E}" type="datetimeFigureOut">
               <a:rPr lang="en-US" smtClean="0"/>
-              <a:t>11/7/2016</a:t>
+              <a:t>11/9/2016</a:t>
             </a:fld>
             <a:endParaRPr lang="en-US"/>
           </a:p>
@@ -839,7 +839,7 @@
           <a:p>
             <a:fld id="{2F1F79F5-7BEC-496A-AFC7-876E38F64D71}" type="datetime1">
               <a:rPr lang="en-US" smtClean="0"/>
-              <a:t>11/7/2016</a:t>
+              <a:t>11/9/2016</a:t>
             </a:fld>
             <a:endParaRPr lang="en-US"/>
           </a:p>
@@ -956,7 +956,7 @@
           <a:p>
             <a:fld id="{2F7B77F5-1464-4F6B-92A8-64FC8A508293}" type="datetime1">
               <a:rPr lang="en-US" smtClean="0"/>
-              <a:t>11/7/2016</a:t>
+              <a:t>11/9/2016</a:t>
             </a:fld>
             <a:endParaRPr lang="en-US"/>
           </a:p>
@@ -1051,7 +1051,7 @@
           <a:p>
             <a:fld id="{0A05703A-7669-4FEA-9056-25299B4D29D4}" type="datetime1">
               <a:rPr lang="en-US" smtClean="0"/>
-              <a:t>11/7/2016</a:t>
+              <a:t>11/9/2016</a:t>
             </a:fld>
             <a:endParaRPr lang="en-US"/>
           </a:p>
@@ -1326,7 +1326,7 @@
           <a:p>
             <a:fld id="{6E5077B5-BB57-49DB-88CA-226A139E5C01}" type="datetime1">
               <a:rPr lang="en-US" smtClean="0"/>
-              <a:t>11/7/2016</a:t>
+              <a:t>11/9/2016</a:t>
             </a:fld>
             <a:endParaRPr lang="en-US"/>
           </a:p>
@@ -1578,7 +1578,7 @@
           <a:p>
             <a:fld id="{C48D9447-CBD6-49A1-89FD-8512A8CF8999}" type="datetime1">
               <a:rPr lang="en-US" smtClean="0"/>
-              <a:t>11/7/2016</a:t>
+              <a:t>11/9/2016</a:t>
             </a:fld>
             <a:endParaRPr lang="en-US"/>
           </a:p>
@@ -1746,7 +1746,7 @@
           <a:p>
             <a:fld id="{A3639A2A-823D-48B7-9ACE-7FAF42870BA9}" type="datetime1">
               <a:rPr lang="en-US" smtClean="0"/>
-              <a:t>11/7/2016</a:t>
+              <a:t>11/9/2016</a:t>
             </a:fld>
             <a:endParaRPr lang="en-US"/>
           </a:p>
@@ -1924,7 +1924,7 @@
           <a:p>
             <a:fld id="{ED1B6996-82E9-463C-972C-7B56056E426C}" type="datetime1">
               <a:rPr lang="en-US" smtClean="0"/>
-              <a:t>11/7/2016</a:t>
+              <a:t>11/9/2016</a:t>
             </a:fld>
             <a:endParaRPr lang="en-US"/>
           </a:p>
@@ -2098,7 +2098,7 @@
           <a:p>
             <a:fld id="{E22ED4DA-448D-4BB1-B935-CC112220207B}" type="datetime1">
               <a:rPr lang="en-US" smtClean="0"/>
-              <a:t>11/7/2016</a:t>
+              <a:t>11/9/2016</a:t>
             </a:fld>
             <a:endParaRPr lang="en-US"/>
           </a:p>
@@ -2271,7 +2271,7 @@
           <a:p>
             <a:fld id="{E22ED4DA-448D-4BB1-B935-CC112220207B}" type="datetime1">
               <a:rPr lang="en-US" smtClean="0"/>
-              <a:t>11/7/2016</a:t>
+              <a:t>11/9/2016</a:t>
             </a:fld>
             <a:endParaRPr lang="en-US"/>
           </a:p>
@@ -2531,7 +2531,7 @@
           <a:p>
             <a:fld id="{FF5D65A6-AB94-4435-B0B7-3743215FA46C}" type="datetime1">
               <a:rPr lang="en-US" smtClean="0"/>
-              <a:t>11/7/2016</a:t>
+              <a:t>11/9/2016</a:t>
             </a:fld>
             <a:endParaRPr lang="en-US"/>
           </a:p>
@@ -2824,7 +2824,7 @@
           <a:p>
             <a:fld id="{5D1846AD-9252-4647-9435-4C2AC365653A}" type="datetime1">
               <a:rPr lang="en-US" smtClean="0"/>
-              <a:t>11/7/2016</a:t>
+              <a:t>11/9/2016</a:t>
             </a:fld>
             <a:endParaRPr lang="en-US"/>
           </a:p>
@@ -3000,7 +3000,7 @@
           <a:p>
             <a:fld id="{FF5D65A6-AB94-4435-B0B7-3743215FA46C}" type="datetime1">
               <a:rPr lang="en-US" smtClean="0"/>
-              <a:t>11/7/2016</a:t>
+              <a:t>11/9/2016</a:t>
             </a:fld>
             <a:endParaRPr lang="en-US"/>
           </a:p>
@@ -3294,7 +3294,7 @@
           <a:p>
             <a:fld id="{7C193DC4-6EF0-48C9-B29C-616106A645E1}" type="datetime1">
               <a:rPr lang="en-US" smtClean="0"/>
-              <a:t>11/7/2016</a:t>
+              <a:t>11/9/2016</a:t>
             </a:fld>
             <a:endParaRPr lang="en-US"/>
           </a:p>
@@ -3579,7 +3579,7 @@
           <a:p>
             <a:fld id="{5D1846AD-9252-4647-9435-4C2AC365653A}" type="datetime1">
               <a:rPr lang="en-US" smtClean="0"/>
-              <a:t>11/7/2016</a:t>
+              <a:t>11/9/2016</a:t>
             </a:fld>
             <a:endParaRPr lang="en-US"/>
           </a:p>
@@ -3998,7 +3998,7 @@
           <a:p>
             <a:fld id="{CE56DC10-3561-4063-A6AF-C1CC7A41040A}" type="datetime1">
               <a:rPr lang="en-US" smtClean="0"/>
-              <a:t>11/7/2016</a:t>
+              <a:t>11/9/2016</a:t>
             </a:fld>
             <a:endParaRPr lang="en-US"/>
           </a:p>
@@ -4221,7 +4221,7 @@
           <a:p>
             <a:fld id="{02B3F677-983B-48DB-ADFD-63FE6CBC7FB2}" type="datetime1">
               <a:rPr lang="en-US" smtClean="0"/>
-              <a:t>11/7/2016</a:t>
+              <a:t>11/9/2016</a:t>
             </a:fld>
             <a:endParaRPr lang="en-US"/>
           </a:p>
@@ -6786,295 +6786,320 @@
           <a:lstStyle/>
           <a:p>
             <a:r>
-              <a:rPr lang="en-US" dirty="0"/>
-              <a:t>World%</a:t>
-            </a:r>
-          </a:p>
-        </p:txBody>
-      </p:sp>
-      <p:sp>
-        <p:nvSpPr>
-          <p:cNvPr id="3" name="Content Placeholder 2"/>
-          <p:cNvSpPr>
-            <a:spLocks noGrp="1"/>
-          </p:cNvSpPr>
-          <p:nvPr>
-            <p:ph idx="1"/>
-          </p:nvPr>
-        </p:nvSpPr>
-        <p:spPr/>
-        <p:txBody>
-          <a:bodyPr>
-            <a:normAutofit fontScale="32500" lnSpcReduction="20000"/>
-          </a:bodyPr>
-          <a:lstStyle/>
-          <a:p>
-            <a:r>
-              <a:rPr lang="en-US" dirty="0"/>
-              <a:t>; </a:t>
-            </a:r>
-            <a:r>
-              <a:rPr lang="en-US" dirty="0" err="1"/>
-              <a:t>ListOfWidget</a:t>
-            </a:r>
-            <a:r>
-              <a:rPr lang="en-US" dirty="0"/>
-              <a:t> </a:t>
-            </a:r>
-            <a:r>
-              <a:rPr lang="en-US" dirty="0" err="1"/>
-              <a:t>ListOfSWidget</a:t>
-            </a:r>
-            <a:r>
-              <a:rPr lang="en-US" dirty="0"/>
-              <a:t> -&gt; World</a:t>
-            </a:r>
-          </a:p>
-          <a:p>
-            <a:r>
-              <a:rPr lang="en-US" dirty="0"/>
-              <a:t>(define (make-world </a:t>
-            </a:r>
-            <a:r>
-              <a:rPr lang="en-US" dirty="0" err="1"/>
-              <a:t>objs</a:t>
-            </a:r>
-            <a:r>
-              <a:rPr lang="en-US" dirty="0"/>
-              <a:t> </a:t>
-            </a:r>
-            <a:r>
-              <a:rPr lang="en-US" dirty="0" err="1"/>
-              <a:t>sobjs</a:t>
-            </a:r>
-            <a:r>
-              <a:rPr lang="en-US" dirty="0"/>
-              <a:t>)</a:t>
-            </a:r>
-          </a:p>
-          <a:p>
-            <a:r>
-              <a:rPr lang="en-US" dirty="0"/>
-              <a:t>  (new World% [</a:t>
-            </a:r>
-            <a:r>
-              <a:rPr lang="en-US" dirty="0" err="1"/>
-              <a:t>objs</a:t>
-            </a:r>
-            <a:r>
-              <a:rPr lang="en-US" dirty="0"/>
-              <a:t> </a:t>
-            </a:r>
-            <a:r>
-              <a:rPr lang="en-US" dirty="0" err="1"/>
-              <a:t>objs</a:t>
-            </a:r>
-            <a:r>
-              <a:rPr lang="en-US" dirty="0"/>
-              <a:t>][</a:t>
-            </a:r>
-            <a:r>
-              <a:rPr lang="en-US" dirty="0" err="1"/>
-              <a:t>sobjs</a:t>
-            </a:r>
-            <a:r>
-              <a:rPr lang="en-US" dirty="0"/>
-              <a:t> </a:t>
-            </a:r>
-            <a:r>
-              <a:rPr lang="en-US" dirty="0" err="1"/>
-              <a:t>sobjs</a:t>
-            </a:r>
-            <a:r>
-              <a:rPr lang="en-US" dirty="0"/>
-              <a:t>]))</a:t>
-            </a:r>
-          </a:p>
-          <a:p>
-            <a:endParaRPr lang="en-US" dirty="0"/>
-          </a:p>
-          <a:p>
-            <a:r>
-              <a:rPr lang="en-US" dirty="0"/>
-              <a:t>(define World%</a:t>
-            </a:r>
-          </a:p>
-          <a:p>
-            <a:r>
-              <a:rPr lang="en-US" dirty="0"/>
-              <a:t>  (class* object% (</a:t>
-            </a:r>
-            <a:r>
               <a:rPr lang="en-US" dirty="0" err="1"/>
               <a:t>SWorld</a:t>
             </a:r>
             <a:r>
               <a:rPr lang="en-US" dirty="0"/>
+              <a:t>%</a:t>
+            </a:r>
+          </a:p>
+        </p:txBody>
+      </p:sp>
+      <p:sp>
+        <p:nvSpPr>
+          <p:cNvPr id="3" name="Content Placeholder 2"/>
+          <p:cNvSpPr>
+            <a:spLocks noGrp="1"/>
+          </p:cNvSpPr>
+          <p:nvPr>
+            <p:ph idx="1"/>
+          </p:nvPr>
+        </p:nvSpPr>
+        <p:spPr>
+          <a:xfrm>
+            <a:off x="457200" y="1600200"/>
+            <a:ext cx="8229600" cy="4953000"/>
+          </a:xfrm>
+        </p:spPr>
+        <p:txBody>
+          <a:bodyPr>
+            <a:noAutofit/>
+          </a:bodyPr>
+          <a:lstStyle/>
+          <a:p>
+            <a:r>
+              <a:rPr lang="en-US" sz="1050" dirty="0"/>
+              <a:t>; </a:t>
+            </a:r>
+            <a:r>
+              <a:rPr lang="en-US" sz="1050" dirty="0" err="1"/>
+              <a:t>ListOfWidget</a:t>
+            </a:r>
+            <a:r>
+              <a:rPr lang="en-US" sz="1050" dirty="0"/>
+              <a:t> </a:t>
+            </a:r>
+            <a:r>
+              <a:rPr lang="en-US" sz="1050" dirty="0" err="1"/>
+              <a:t>ListOfSWidget</a:t>
+            </a:r>
+            <a:r>
+              <a:rPr lang="en-US" sz="1050" dirty="0"/>
+              <a:t> -&gt; World</a:t>
+            </a:r>
+          </a:p>
+          <a:p>
+            <a:r>
+              <a:rPr lang="en-US" sz="1050" dirty="0"/>
+              <a:t>(define (make-world </a:t>
+            </a:r>
+            <a:r>
+              <a:rPr lang="en-US" sz="1050" dirty="0" err="1"/>
+              <a:t>objs</a:t>
+            </a:r>
+            <a:r>
+              <a:rPr lang="en-US" sz="1050" dirty="0"/>
+              <a:t> </a:t>
+            </a:r>
+            <a:r>
+              <a:rPr lang="en-US" sz="1050" dirty="0" err="1"/>
+              <a:t>sobjs</a:t>
+            </a:r>
+            <a:r>
+              <a:rPr lang="en-US" sz="1050" dirty="0"/>
+              <a:t>)</a:t>
+            </a:r>
+          </a:p>
+          <a:p>
+            <a:r>
+              <a:rPr lang="en-US" sz="1050" dirty="0"/>
+              <a:t>  (new </a:t>
+            </a:r>
+            <a:r>
+              <a:rPr lang="en-US" sz="1050" dirty="0" err="1"/>
+              <a:t>SWorld</a:t>
+            </a:r>
+            <a:r>
+              <a:rPr lang="en-US" sz="1050" dirty="0"/>
+              <a:t>% [</a:t>
+            </a:r>
+            <a:r>
+              <a:rPr lang="en-US" sz="1050" dirty="0" err="1"/>
+              <a:t>objs</a:t>
+            </a:r>
+            <a:r>
+              <a:rPr lang="en-US" sz="1050" dirty="0"/>
+              <a:t> </a:t>
+            </a:r>
+            <a:r>
+              <a:rPr lang="en-US" sz="1050" dirty="0" err="1"/>
+              <a:t>objs</a:t>
+            </a:r>
+            <a:r>
+              <a:rPr lang="en-US" sz="1050" dirty="0"/>
+              <a:t>][</a:t>
+            </a:r>
+            <a:r>
+              <a:rPr lang="en-US" sz="1050" dirty="0" err="1"/>
+              <a:t>sobjs</a:t>
+            </a:r>
+            <a:r>
+              <a:rPr lang="en-US" sz="1050" dirty="0"/>
+              <a:t> </a:t>
+            </a:r>
+            <a:r>
+              <a:rPr lang="en-US" sz="1050" dirty="0" err="1"/>
+              <a:t>sobjs</a:t>
+            </a:r>
+            <a:r>
+              <a:rPr lang="en-US" sz="1050" dirty="0"/>
+              <a:t>]))</a:t>
+            </a:r>
+          </a:p>
+          <a:p>
+            <a:endParaRPr lang="en-US" sz="1050" dirty="0"/>
+          </a:p>
+          <a:p>
+            <a:r>
+              <a:rPr lang="en-US" sz="1050" dirty="0"/>
+              <a:t>(define </a:t>
+            </a:r>
+            <a:r>
+              <a:rPr lang="en-US" sz="1050" dirty="0" err="1"/>
+              <a:t>SWorld</a:t>
+            </a:r>
+            <a:r>
+              <a:rPr lang="en-US" sz="1050" dirty="0"/>
+              <a:t>%</a:t>
+            </a:r>
+          </a:p>
+          <a:p>
+            <a:r>
+              <a:rPr lang="en-US" sz="1050" dirty="0"/>
+              <a:t>  (class* object% (</a:t>
+            </a:r>
+            <a:r>
+              <a:rPr lang="en-US" sz="1050" dirty="0" err="1"/>
+              <a:t>SWorld</a:t>
+            </a:r>
+            <a:r>
+              <a:rPr lang="en-US" sz="1050" dirty="0"/>
               <a:t>&lt;%&gt;)</a:t>
             </a:r>
           </a:p>
           <a:p>
             <a:r>
-              <a:rPr lang="en-US" dirty="0"/>
+              <a:rPr lang="en-US" sz="1050" dirty="0"/>
               <a:t>    </a:t>
             </a:r>
           </a:p>
           <a:p>
             <a:r>
-              <a:rPr lang="en-US" dirty="0"/>
+              <a:rPr lang="en-US" sz="1050" dirty="0"/>
               <a:t>    (</a:t>
             </a:r>
             <a:r>
-              <a:rPr lang="en-US" dirty="0" err="1"/>
+              <a:rPr lang="en-US" sz="1050" dirty="0" err="1"/>
               <a:t>init</a:t>
             </a:r>
             <a:r>
-              <a:rPr lang="en-US" dirty="0"/>
+              <a:rPr lang="en-US" sz="1050" dirty="0"/>
               <a:t>-field </a:t>
             </a:r>
             <a:r>
-              <a:rPr lang="en-US" dirty="0" err="1"/>
+              <a:rPr lang="en-US" sz="1050" dirty="0" err="1"/>
               <a:t>objs</a:t>
             </a:r>
             <a:r>
-              <a:rPr lang="en-US" dirty="0"/>
+              <a:rPr lang="en-US" sz="1050" dirty="0"/>
               <a:t>)   ; </a:t>
             </a:r>
             <a:r>
-              <a:rPr lang="en-US" dirty="0" err="1"/>
+              <a:rPr lang="en-US" sz="1050" dirty="0" err="1"/>
               <a:t>ListOfWidget</a:t>
             </a:r>
-            <a:endParaRPr lang="en-US" dirty="0"/>
-          </a:p>
-          <a:p>
-            <a:r>
-              <a:rPr lang="en-US" dirty="0"/>
+            <a:endParaRPr lang="en-US" sz="1050" dirty="0"/>
+          </a:p>
+          <a:p>
+            <a:r>
+              <a:rPr lang="en-US" sz="1050" dirty="0"/>
               <a:t>    (</a:t>
             </a:r>
             <a:r>
-              <a:rPr lang="en-US" dirty="0" err="1"/>
+              <a:rPr lang="en-US" sz="1050" dirty="0" err="1"/>
               <a:t>init</a:t>
             </a:r>
             <a:r>
-              <a:rPr lang="en-US" dirty="0"/>
+              <a:rPr lang="en-US" sz="1050" dirty="0"/>
               <a:t>-field </a:t>
             </a:r>
             <a:r>
-              <a:rPr lang="en-US" dirty="0" err="1"/>
+              <a:rPr lang="en-US" sz="1050" dirty="0" err="1"/>
               <a:t>sobjs</a:t>
             </a:r>
             <a:r>
-              <a:rPr lang="en-US" dirty="0"/>
+              <a:rPr lang="en-US" sz="1050" dirty="0"/>
               <a:t>)  ; </a:t>
             </a:r>
             <a:r>
-              <a:rPr lang="en-US" dirty="0" err="1"/>
+              <a:rPr lang="en-US" sz="1050" dirty="0" err="1"/>
               <a:t>ListOfSWidget</a:t>
             </a:r>
-            <a:endParaRPr lang="en-US" dirty="0"/>
-          </a:p>
-          <a:p>
-            <a:endParaRPr lang="en-US" dirty="0"/>
-          </a:p>
-          <a:p>
-            <a:r>
-              <a:rPr lang="en-US" dirty="0"/>
+            <a:endParaRPr lang="en-US" sz="1050" dirty="0"/>
+          </a:p>
+          <a:p>
+            <a:endParaRPr lang="en-US" sz="1050" dirty="0"/>
+          </a:p>
+          <a:p>
+            <a:r>
+              <a:rPr lang="en-US" sz="1050" dirty="0"/>
               <a:t>    (super-new)</a:t>
             </a:r>
           </a:p>
           <a:p>
-            <a:endParaRPr lang="en-US" dirty="0"/>
-          </a:p>
-          <a:p>
-            <a:r>
-              <a:rPr lang="en-US" dirty="0"/>
+            <a:endParaRPr lang="en-US" sz="1050" dirty="0"/>
+          </a:p>
+          <a:p>
+            <a:r>
+              <a:rPr lang="en-US" sz="1050" dirty="0"/>
               <a:t>    ;; after-tick : -&gt; Void</a:t>
             </a:r>
           </a:p>
           <a:p>
             <a:r>
-              <a:rPr lang="en-US" dirty="0"/>
+              <a:rPr lang="en-US" sz="1050" dirty="0"/>
               <a:t>    ;; Use map on the Widgets in this World; use for-each on the</a:t>
             </a:r>
           </a:p>
           <a:p>
             <a:r>
-              <a:rPr lang="en-US" dirty="0"/>
+              <a:rPr lang="en-US" sz="1050" dirty="0"/>
               <a:t>    ;; </a:t>
             </a:r>
             <a:r>
-              <a:rPr lang="en-US" dirty="0" err="1"/>
+              <a:rPr lang="en-US" sz="1050" dirty="0" err="1"/>
               <a:t>stateful</a:t>
             </a:r>
             <a:r>
-              <a:rPr lang="en-US" dirty="0"/>
+              <a:rPr lang="en-US" sz="1050" dirty="0"/>
               <a:t> widgets</a:t>
             </a:r>
           </a:p>
           <a:p>
-            <a:endParaRPr lang="en-US" dirty="0"/>
-          </a:p>
-          <a:p>
-            <a:r>
-              <a:rPr lang="en-US" dirty="0"/>
+            <a:endParaRPr lang="en-US" sz="1050" dirty="0"/>
+          </a:p>
+          <a:p>
+            <a:r>
+              <a:rPr lang="en-US" sz="1050" dirty="0"/>
               <a:t>    (define/public (after-tick)</a:t>
             </a:r>
           </a:p>
           <a:p>
             <a:r>
-              <a:rPr lang="en-US" dirty="0"/>
+              <a:rPr lang="en-US" sz="1050" dirty="0"/>
               <a:t>      (begin</a:t>
             </a:r>
           </a:p>
           <a:p>
             <a:r>
-              <a:rPr lang="en-US" dirty="0"/>
+              <a:rPr lang="en-US" sz="1050" dirty="0"/>
               <a:t>        (for-each</a:t>
             </a:r>
           </a:p>
           <a:p>
             <a:r>
-              <a:rPr lang="en-US" dirty="0"/>
+              <a:rPr lang="en-US" sz="1050" dirty="0"/>
               <a:t>          (lambda (</a:t>
             </a:r>
             <a:r>
-              <a:rPr lang="en-US" dirty="0" err="1"/>
+              <a:rPr lang="en-US" sz="1050" dirty="0" err="1"/>
               <a:t>obj</a:t>
             </a:r>
             <a:r>
-              <a:rPr lang="en-US" dirty="0"/>
+              <a:rPr lang="en-US" sz="1050" dirty="0"/>
               <a:t>) (send </a:t>
             </a:r>
             <a:r>
-              <a:rPr lang="en-US" dirty="0" err="1"/>
+              <a:rPr lang="en-US" sz="1050" dirty="0" err="1"/>
               <a:t>obj</a:t>
             </a:r>
             <a:r>
-              <a:rPr lang="en-US" dirty="0"/>
+              <a:rPr lang="en-US" sz="1050" dirty="0"/>
               <a:t> after-tick))</a:t>
             </a:r>
           </a:p>
           <a:p>
             <a:r>
-              <a:rPr lang="en-US" dirty="0"/>
+              <a:rPr lang="en-US" sz="1050" dirty="0"/>
               <a:t>          </a:t>
             </a:r>
             <a:r>
-              <a:rPr lang="en-US" dirty="0" err="1"/>
+              <a:rPr lang="en-US" sz="1050" dirty="0" err="1"/>
               <a:t>sobjs</a:t>
             </a:r>
             <a:r>
-              <a:rPr lang="en-US" dirty="0"/>
+              <a:rPr lang="en-US" sz="1050" dirty="0"/>
               <a:t>)</a:t>
             </a:r>
           </a:p>
           <a:p>
             <a:r>
-              <a:rPr lang="en-US" dirty="0"/>
+              <a:rPr lang="en-US" sz="1050" dirty="0"/>
               <a:t>        (</a:t>
             </a:r>
             <a:r>
-              <a:rPr lang="en-US" dirty="0">
+              <a:rPr lang="en-US" sz="1050" dirty="0">
                 <a:solidFill>
                   <a:srgbClr val="FF0000"/>
                 </a:solidFill>
@@ -7082,58 +7107,58 @@
               <a:t>set! </a:t>
             </a:r>
             <a:r>
-              <a:rPr lang="en-US" dirty="0" err="1"/>
+              <a:rPr lang="en-US" sz="1050" dirty="0" err="1"/>
               <a:t>objs</a:t>
             </a:r>
             <a:r>
-              <a:rPr lang="en-US" dirty="0"/>
+              <a:rPr lang="en-US" sz="1050" dirty="0"/>
               <a:t> </a:t>
             </a:r>
           </a:p>
           <a:p>
             <a:r>
-              <a:rPr lang="en-US" dirty="0"/>
+              <a:rPr lang="en-US" sz="1050" dirty="0"/>
               <a:t>          (map </a:t>
             </a:r>
           </a:p>
           <a:p>
             <a:r>
-              <a:rPr lang="en-US" dirty="0"/>
+              <a:rPr lang="en-US" sz="1050" dirty="0"/>
               <a:t>            (lambda (</a:t>
             </a:r>
             <a:r>
-              <a:rPr lang="en-US" dirty="0" err="1"/>
+              <a:rPr lang="en-US" sz="1050" dirty="0" err="1"/>
               <a:t>obj</a:t>
             </a:r>
             <a:r>
-              <a:rPr lang="en-US" dirty="0"/>
+              <a:rPr lang="en-US" sz="1050" dirty="0"/>
               <a:t>) (send </a:t>
             </a:r>
             <a:r>
-              <a:rPr lang="en-US" dirty="0" err="1"/>
+              <a:rPr lang="en-US" sz="1050" dirty="0" err="1"/>
               <a:t>obj</a:t>
             </a:r>
             <a:r>
-              <a:rPr lang="en-US" dirty="0"/>
+              <a:rPr lang="en-US" sz="1050" dirty="0"/>
               <a:t> after-tick))</a:t>
             </a:r>
           </a:p>
           <a:p>
             <a:r>
-              <a:rPr lang="en-US" dirty="0"/>
+              <a:rPr lang="en-US" sz="1050" dirty="0"/>
               <a:t>            </a:t>
             </a:r>
             <a:r>
-              <a:rPr lang="en-US" dirty="0" err="1"/>
+              <a:rPr lang="en-US" sz="1050" dirty="0" err="1"/>
               <a:t>objs</a:t>
             </a:r>
             <a:r>
-              <a:rPr lang="en-US" dirty="0"/>
+              <a:rPr lang="en-US" sz="1050" dirty="0"/>
               <a:t>))))</a:t>
             </a:r>
           </a:p>
           <a:p>
-            <a:endParaRPr lang="en-US" dirty="0"/>
+            <a:endParaRPr lang="en-US" sz="1050" dirty="0"/>
           </a:p>
         </p:txBody>
       </p:sp>
@@ -7168,7 +7193,7 @@
         </p:nvSpPr>
         <p:spPr>
           <a:xfrm>
-            <a:off x="5029200" y="4256538"/>
+            <a:off x="5128054" y="5037138"/>
             <a:ext cx="2850292" cy="1066800"/>
           </a:xfrm>
           <a:prstGeom prst="rect">
@@ -7214,7 +7239,23 @@
                   <a:schemeClr val="tx1"/>
                 </a:solidFill>
               </a:rPr>
-              <a:t>We replace each call to make-world or new with a suitable set!, just as in the preceding lesson.</a:t>
+              <a:t>We replace each call to make-</a:t>
+            </a:r>
+            <a:r>
+              <a:rPr lang="en-US" sz="1400" dirty="0" err="1">
+                <a:solidFill>
+                  <a:schemeClr val="tx1"/>
+                </a:solidFill>
+              </a:rPr>
+              <a:t>sworld</a:t>
+            </a:r>
+            <a:r>
+              <a:rPr lang="en-US" sz="1400" dirty="0">
+                <a:solidFill>
+                  <a:schemeClr val="tx1"/>
+                </a:solidFill>
+              </a:rPr>
+              <a:t> or new with a suitable set!, just as in the preceding lesson.</a:t>
             </a:r>
           </a:p>
         </p:txBody>
@@ -7229,8 +7270,8 @@
         </p:nvCxnSpPr>
         <p:spPr>
           <a:xfrm flipH="1">
-            <a:off x="1905000" y="4789938"/>
-            <a:ext cx="3124200" cy="86862"/>
+            <a:off x="2057400" y="5570538"/>
+            <a:ext cx="3070654" cy="220662"/>
           </a:xfrm>
           <a:prstGeom prst="straightConnector1">
             <a:avLst/>
@@ -7681,8 +7722,13 @@
           <a:p>
             <a:r>
               <a:rPr lang="en-US" sz="1800" dirty="0"/>
-              <a:t>;; initial-world : -&gt; World</a:t>
-            </a:r>
+              <a:t>;; initial-world : -&gt; </a:t>
+            </a:r>
+            <a:r>
+              <a:rPr lang="en-US" sz="1800" dirty="0" err="1"/>
+              <a:t>SWorld</a:t>
+            </a:r>
+            <a:endParaRPr lang="en-US" sz="1800" dirty="0"/>
           </a:p>
           <a:p>
             <a:r>
@@ -7723,8 +7769,13 @@
           <a:p>
             <a:r>
               <a:rPr lang="en-US" sz="1800" dirty="0"/>
-              <a:t>    (make-world</a:t>
-            </a:r>
+              <a:t>    (make-</a:t>
+            </a:r>
+            <a:r>
+              <a:rPr lang="en-US" sz="1800" dirty="0" err="1"/>
+              <a:t>sworld</a:t>
+            </a:r>
+            <a:endParaRPr lang="en-US" sz="1800" dirty="0"/>
           </a:p>
           <a:p>
             <a:r>
@@ -7812,7 +7863,7 @@
           <a:p>
             <a:r>
               <a:rPr lang="en-US" dirty="0"/>
-              <a:t>Now let's add a method to add new widgets to the world</a:t>
+              <a:t>Now let's add methods to add new widgets to the world</a:t>
             </a:r>
           </a:p>
         </p:txBody>
@@ -8079,7 +8130,15 @@
             </a:r>
             <a:r>
               <a:rPr lang="en-US" sz="1800" dirty="0"/>
-              <a:t>-widget w)</a:t>
+              <a:t>-widget </a:t>
+            </a:r>
+            <a:r>
+              <a:rPr lang="en-US" sz="1800" dirty="0" err="1"/>
+              <a:t>sw</a:t>
+            </a:r>
+            <a:r>
+              <a:rPr lang="en-US" sz="1800" dirty="0"/>
+              <a:t>)</a:t>
             </a:r>
           </a:p>
           <a:p>
@@ -8093,7 +8152,15 @@
             </a:r>
             <a:r>
               <a:rPr lang="en-US" sz="1800" dirty="0"/>
-              <a:t> (cons w </a:t>
+              <a:t> (cons </a:t>
+            </a:r>
+            <a:r>
+              <a:rPr lang="en-US" sz="1800" dirty="0" err="1"/>
+              <a:t>sw</a:t>
+            </a:r>
+            <a:r>
+              <a:rPr lang="en-US" sz="1800" dirty="0"/>
+              <a:t> </a:t>
             </a:r>
             <a:r>
               <a:rPr lang="en-US" sz="1800" dirty="0" err="1"/>

</xml_diff>